<commit_message>
Adding the new Power Point
</commit_message>
<xml_diff>
--- a/New Devices Lab - Pitch.pptx
+++ b/New Devices Lab - Pitch.pptx
@@ -278,7 +278,7 @@
           <a:p>
             <a:fld id="{29FD8189-83BA-4802-A03C-66DFA36BFF16}" type="datetimeFigureOut">
               <a:rPr lang="en-NL" smtClean="0"/>
-              <a:t>24/09/2023</a:t>
+              <a:t>26/09/2023</a:t>
             </a:fld>
             <a:endParaRPr lang="en-NL"/>
           </a:p>
@@ -478,7 +478,7 @@
           <a:p>
             <a:fld id="{29FD8189-83BA-4802-A03C-66DFA36BFF16}" type="datetimeFigureOut">
               <a:rPr lang="en-NL" smtClean="0"/>
-              <a:t>24/09/2023</a:t>
+              <a:t>26/09/2023</a:t>
             </a:fld>
             <a:endParaRPr lang="en-NL"/>
           </a:p>
@@ -688,7 +688,7 @@
           <a:p>
             <a:fld id="{29FD8189-83BA-4802-A03C-66DFA36BFF16}" type="datetimeFigureOut">
               <a:rPr lang="en-NL" smtClean="0"/>
-              <a:t>24/09/2023</a:t>
+              <a:t>26/09/2023</a:t>
             </a:fld>
             <a:endParaRPr lang="en-NL"/>
           </a:p>
@@ -888,7 +888,7 @@
           <a:p>
             <a:fld id="{29FD8189-83BA-4802-A03C-66DFA36BFF16}" type="datetimeFigureOut">
               <a:rPr lang="en-NL" smtClean="0"/>
-              <a:t>24/09/2023</a:t>
+              <a:t>26/09/2023</a:t>
             </a:fld>
             <a:endParaRPr lang="en-NL"/>
           </a:p>
@@ -1164,7 +1164,7 @@
           <a:p>
             <a:fld id="{29FD8189-83BA-4802-A03C-66DFA36BFF16}" type="datetimeFigureOut">
               <a:rPr lang="en-NL" smtClean="0"/>
-              <a:t>24/09/2023</a:t>
+              <a:t>26/09/2023</a:t>
             </a:fld>
             <a:endParaRPr lang="en-NL"/>
           </a:p>
@@ -1432,7 +1432,7 @@
           <a:p>
             <a:fld id="{29FD8189-83BA-4802-A03C-66DFA36BFF16}" type="datetimeFigureOut">
               <a:rPr lang="en-NL" smtClean="0"/>
-              <a:t>24/09/2023</a:t>
+              <a:t>26/09/2023</a:t>
             </a:fld>
             <a:endParaRPr lang="en-NL"/>
           </a:p>
@@ -1847,7 +1847,7 @@
           <a:p>
             <a:fld id="{29FD8189-83BA-4802-A03C-66DFA36BFF16}" type="datetimeFigureOut">
               <a:rPr lang="en-NL" smtClean="0"/>
-              <a:t>24/09/2023</a:t>
+              <a:t>26/09/2023</a:t>
             </a:fld>
             <a:endParaRPr lang="en-NL"/>
           </a:p>
@@ -1989,7 +1989,7 @@
           <a:p>
             <a:fld id="{29FD8189-83BA-4802-A03C-66DFA36BFF16}" type="datetimeFigureOut">
               <a:rPr lang="en-NL" smtClean="0"/>
-              <a:t>24/09/2023</a:t>
+              <a:t>26/09/2023</a:t>
             </a:fld>
             <a:endParaRPr lang="en-NL"/>
           </a:p>
@@ -2102,7 +2102,7 @@
           <a:p>
             <a:fld id="{29FD8189-83BA-4802-A03C-66DFA36BFF16}" type="datetimeFigureOut">
               <a:rPr lang="en-NL" smtClean="0"/>
-              <a:t>24/09/2023</a:t>
+              <a:t>26/09/2023</a:t>
             </a:fld>
             <a:endParaRPr lang="en-NL"/>
           </a:p>
@@ -2415,7 +2415,7 @@
           <a:p>
             <a:fld id="{29FD8189-83BA-4802-A03C-66DFA36BFF16}" type="datetimeFigureOut">
               <a:rPr lang="en-NL" smtClean="0"/>
-              <a:t>24/09/2023</a:t>
+              <a:t>26/09/2023</a:t>
             </a:fld>
             <a:endParaRPr lang="en-NL"/>
           </a:p>
@@ -2704,7 +2704,7 @@
           <a:p>
             <a:fld id="{29FD8189-83BA-4802-A03C-66DFA36BFF16}" type="datetimeFigureOut">
               <a:rPr lang="en-NL" smtClean="0"/>
-              <a:t>24/09/2023</a:t>
+              <a:t>26/09/2023</a:t>
             </a:fld>
             <a:endParaRPr lang="en-NL"/>
           </a:p>
@@ -2947,7 +2947,7 @@
           <a:p>
             <a:fld id="{29FD8189-83BA-4802-A03C-66DFA36BFF16}" type="datetimeFigureOut">
               <a:rPr lang="en-NL" smtClean="0"/>
-              <a:t>24/09/2023</a:t>
+              <a:t>26/09/2023</a:t>
             </a:fld>
             <a:endParaRPr lang="en-NL"/>
           </a:p>
@@ -4222,7 +4222,7 @@
         </p:nvSpPr>
         <p:spPr>
           <a:xfrm>
-            <a:off x="508000" y="1066800"/>
+            <a:off x="307474" y="1532466"/>
             <a:ext cx="10515600" cy="3793067"/>
           </a:xfrm>
         </p:spPr>
@@ -4244,51 +4244,6 @@
                 <a:cs typeface="Calibri Light"/>
               </a:rPr>
             </a:br>
-            <a:r>
-              <a:rPr lang="en-US" dirty="0">
-                <a:cs typeface="Calibri Light"/>
-              </a:rPr>
-              <a:t>If yes keep them for yourself </a:t>
-            </a:r>
-            <a:r>
-              <a:rPr lang="en-US" dirty="0">
-                <a:cs typeface="Calibri Light"/>
-                <a:sym typeface="Wingdings" panose="05000000000000000000" pitchFamily="2" charset="2"/>
-              </a:rPr>
-              <a:t></a:t>
-            </a:r>
-            <a:br>
-              <a:rPr lang="en-US" dirty="0">
-                <a:cs typeface="Calibri Light"/>
-                <a:sym typeface="Wingdings" panose="05000000000000000000" pitchFamily="2" charset="2"/>
-              </a:rPr>
-            </a:br>
-            <a:r>
-              <a:rPr lang="en-US" dirty="0">
-                <a:cs typeface="Calibri Light"/>
-                <a:sym typeface="Wingdings" panose="05000000000000000000" pitchFamily="2" charset="2"/>
-              </a:rPr>
-              <a:t>Criticism?</a:t>
-            </a:r>
-            <a:br>
-              <a:rPr lang="en-US" dirty="0">
-                <a:cs typeface="Calibri Light"/>
-                <a:sym typeface="Wingdings" panose="05000000000000000000" pitchFamily="2" charset="2"/>
-              </a:rPr>
-            </a:br>
-            <a:r>
-              <a:rPr lang="en-US" dirty="0">
-                <a:cs typeface="Calibri Light"/>
-              </a:rPr>
-              <a:t>Go fuck yourself </a:t>
-            </a:r>
-            <a:r>
-              <a:rPr lang="en-US" dirty="0">
-                <a:cs typeface="Calibri Light"/>
-                <a:sym typeface="Wingdings" panose="05000000000000000000" pitchFamily="2" charset="2"/>
-              </a:rPr>
-              <a:t></a:t>
-            </a:r>
             <a:endParaRPr lang="en-US" dirty="0">
               <a:cs typeface="Calibri Light"/>
             </a:endParaRPr>
@@ -4703,15 +4658,6 @@
 </file>
 
 <file path=customXml/item1.xml><?xml version="1.0" encoding="utf-8"?>
-<?mso-contentType ?>
-<FormTemplates xmlns="http://schemas.microsoft.com/sharepoint/v3/contenttype/forms">
-  <Display>DocumentLibraryForm</Display>
-  <Edit>DocumentLibraryForm</Edit>
-  <New>DocumentLibraryForm</New>
-</FormTemplates>
-</file>
-
-<file path=customXml/item2.xml><?xml version="1.0" encoding="utf-8"?>
 <ct:contentTypeSchema xmlns:ct="http://schemas.microsoft.com/office/2006/metadata/contentType" xmlns:ma="http://schemas.microsoft.com/office/2006/metadata/properties/metaAttributes" ct:_="" ma:_="" ma:contentTypeName="Document" ma:contentTypeID="0x010100A198887BAD630D4FB537CE189C70927A" ma:contentTypeVersion="6" ma:contentTypeDescription="Een nieuw document maken." ma:contentTypeScope="" ma:versionID="da939650af77dd0d8edec71ba35ebcc1">
   <xsd:schema xmlns:xsd="http://www.w3.org/2001/XMLSchema" xmlns:xs="http://www.w3.org/2001/XMLSchema" xmlns:p="http://schemas.microsoft.com/office/2006/metadata/properties" xmlns:ns3="ca87701a-fb51-4264-984b-43b06c285bec" xmlns:ns4="162ae26f-fcd0-43d3-b97b-3cdfe0618b71" targetNamespace="http://schemas.microsoft.com/office/2006/metadata/properties" ma:root="true" ma:fieldsID="ce5ee2c29f92af2c792b544e9b2ffccd" ns3:_="" ns4:_="">
     <xsd:import namespace="ca87701a-fb51-4264-984b-43b06c285bec"/>
@@ -4888,6 +4834,15 @@
 </ct:contentTypeSchema>
 </file>
 
+<file path=customXml/item2.xml><?xml version="1.0" encoding="utf-8"?>
+<?mso-contentType ?>
+<FormTemplates xmlns="http://schemas.microsoft.com/sharepoint/v3/contenttype/forms">
+  <Display>DocumentLibraryForm</Display>
+  <Edit>DocumentLibraryForm</Edit>
+  <New>DocumentLibraryForm</New>
+</FormTemplates>
+</file>
+
 <file path=customXml/item3.xml><?xml version="1.0" encoding="utf-8"?>
 <p:properties xmlns:p="http://schemas.microsoft.com/office/2006/metadata/properties" xmlns:xsi="http://www.w3.org/2001/XMLSchema-instance" xmlns:pc="http://schemas.microsoft.com/office/infopath/2007/PartnerControls">
   <documentManagement>
@@ -4897,14 +4852,6 @@
 </file>
 
 <file path=customXml/itemProps1.xml><?xml version="1.0" encoding="utf-8"?>
-<ds:datastoreItem xmlns:ds="http://schemas.openxmlformats.org/officeDocument/2006/customXml" ds:itemID="{17D27C5F-AAF6-4A39-BC0C-A9B227B6E8D5}">
-  <ds:schemaRefs>
-    <ds:schemaRef ds:uri="http://schemas.microsoft.com/sharepoint/v3/contenttype/forms"/>
-  </ds:schemaRefs>
-</ds:datastoreItem>
-</file>
-
-<file path=customXml/itemProps2.xml><?xml version="1.0" encoding="utf-8"?>
 <ds:datastoreItem xmlns:ds="http://schemas.openxmlformats.org/officeDocument/2006/customXml" ds:itemID="{2367CFAD-DA7A-4166-8AF4-0D1425170BA8}">
   <ds:schemaRefs>
     <ds:schemaRef ds:uri="162ae26f-fcd0-43d3-b97b-3cdfe0618b71"/>
@@ -4919,6 +4866,14 @@
     <ds:schemaRef ds:uri="http://schemas.microsoft.com/office/infopath/2007/PartnerControls"/>
     <ds:schemaRef ds:uri="http://schemas.openxmlformats.org/package/2006/metadata/core-properties"/>
     <ds:schemaRef ds:uri="http://www.w3.org/2001/XMLSchema"/>
+  </ds:schemaRefs>
+</ds:datastoreItem>
+</file>
+
+<file path=customXml/itemProps2.xml><?xml version="1.0" encoding="utf-8"?>
+<ds:datastoreItem xmlns:ds="http://schemas.openxmlformats.org/officeDocument/2006/customXml" ds:itemID="{17D27C5F-AAF6-4A39-BC0C-A9B227B6E8D5}">
+  <ds:schemaRefs>
+    <ds:schemaRef ds:uri="http://schemas.microsoft.com/sharepoint/v3/contenttype/forms"/>
   </ds:schemaRefs>
 </ds:datastoreItem>
 </file>

</xml_diff>